<commit_message>
Add links for Dataset and pairplot
</commit_message>
<xml_diff>
--- a/Introduction to K-Means Clustering.pptx
+++ b/Introduction to K-Means Clustering.pptx
@@ -7368,10 +7368,10 @@
           <a:lstStyle/>
           <a:p>
             <a:r>
-              <a:rPr lang="en-US" dirty="0" err="1">
+              <a:rPr lang="en-US" dirty="0">
                 <a:hlinkClick r:id="rId2"/>
               </a:rPr>
-              <a:t>sklearn.cluster.Kmeans</a:t>
+              <a:t>Wholesale customers Data Set</a:t>
             </a:r>
             <a:endParaRPr lang="en-US" dirty="0"/>
           </a:p>
@@ -7380,7 +7380,7 @@
               <a:rPr lang="en-US" dirty="0" err="1">
                 <a:hlinkClick r:id="rId3"/>
               </a:rPr>
-              <a:t>matplotlib.pyplot.scatter</a:t>
+              <a:t>sklearn.cluster.Kmeans</a:t>
             </a:r>
             <a:endParaRPr lang="en-US" dirty="0"/>
           </a:p>
@@ -7389,11 +7389,29 @@
               <a:rPr lang="en-US" dirty="0" err="1">
                 <a:hlinkClick r:id="rId4"/>
               </a:rPr>
+              <a:t>matplotlib.pyplot.scatter</a:t>
+            </a:r>
+            <a:endParaRPr lang="en-US" dirty="0"/>
+          </a:p>
+          <a:p>
+            <a:r>
+              <a:rPr lang="en-US" dirty="0" err="1">
+                <a:hlinkClick r:id="rId5"/>
+              </a:rPr>
+              <a:t>seaborn.pairplot</a:t>
+            </a:r>
+            <a:endParaRPr lang="en-US" dirty="0"/>
+          </a:p>
+          <a:p>
+            <a:r>
+              <a:rPr lang="en-US" dirty="0" err="1">
+                <a:hlinkClick r:id="rId6"/>
+              </a:rPr>
               <a:t>Jupyter</a:t>
             </a:r>
             <a:r>
               <a:rPr lang="en-US" dirty="0">
-                <a:hlinkClick r:id="rId4"/>
+                <a:hlinkClick r:id="rId6"/>
               </a:rPr>
               <a:t> Notebook &amp; Python Code for this presentation</a:t>
             </a:r>
@@ -15901,6 +15919,21 @@
 </file>
 
 <file path=customXml/item1.xml><?xml version="1.0" encoding="utf-8"?>
+<p:properties xmlns:p="http://schemas.microsoft.com/office/2006/metadata/properties" xmlns:xsi="http://www.w3.org/2001/XMLSchema-instance" xmlns:pc="http://schemas.microsoft.com/office/infopath/2007/PartnerControls">
+  <documentManagement/>
+</p:properties>
+</file>
+
+<file path=customXml/item2.xml><?xml version="1.0" encoding="utf-8"?>
+<?mso-contentType ?>
+<FormTemplates xmlns="http://schemas.microsoft.com/sharepoint/v3/contenttype/forms">
+  <Display>DocumentLibraryForm</Display>
+  <Edit>DocumentLibraryForm</Edit>
+  <New>DocumentLibraryForm</New>
+</FormTemplates>
+</file>
+
+<file path=customXml/item3.xml><?xml version="1.0" encoding="utf-8"?>
 <ct:contentTypeSchema xmlns:ct="http://schemas.microsoft.com/office/2006/metadata/contentType" xmlns:ma="http://schemas.microsoft.com/office/2006/metadata/properties/metaAttributes" ct:_="" ma:_="" ma:contentTypeName="Document" ma:contentTypeID="0x010100A2B1570B17D8EA40B070657D2B3DEFC8" ma:contentTypeVersion="11" ma:contentTypeDescription="Create a new document." ma:contentTypeScope="" ma:versionID="0ea15260252fffe4c765d3bce9ddd74e">
   <xsd:schema xmlns:xsd="http://www.w3.org/2001/XMLSchema" xmlns:xs="http://www.w3.org/2001/XMLSchema" xmlns:p="http://schemas.microsoft.com/office/2006/metadata/properties" xmlns:ns3="a17d4d82-232e-4eae-b6cc-834006444970" xmlns:ns4="8ee9f6c3-3166-4f2b-8d05-f088b88e4d0e" targetNamespace="http://schemas.microsoft.com/office/2006/metadata/properties" ma:root="true" ma:fieldsID="069085f1edf35e949b3d7a66ee975ab4" ns3:_="" ns4:_="">
     <xsd:import namespace="a17d4d82-232e-4eae-b6cc-834006444970"/>
@@ -16111,22 +16144,32 @@
 </ct:contentTypeSchema>
 </file>
 
-<file path=customXml/item2.xml><?xml version="1.0" encoding="utf-8"?>
-<?mso-contentType ?>
-<FormTemplates xmlns="http://schemas.microsoft.com/sharepoint/v3/contenttype/forms">
-  <Display>DocumentLibraryForm</Display>
-  <Edit>DocumentLibraryForm</Edit>
-  <New>DocumentLibraryForm</New>
-</FormTemplates>
+<file path=customXml/itemProps1.xml><?xml version="1.0" encoding="utf-8"?>
+<ds:datastoreItem xmlns:ds="http://schemas.openxmlformats.org/officeDocument/2006/customXml" ds:itemID="{4FCD0442-6A9C-49E5-8376-CD3765CD18A2}">
+  <ds:schemaRefs>
+    <ds:schemaRef ds:uri="http://www.w3.org/XML/1998/namespace"/>
+    <ds:schemaRef ds:uri="http://purl.org/dc/terms/"/>
+    <ds:schemaRef ds:uri="http://schemas.microsoft.com/office/2006/documentManagement/types"/>
+    <ds:schemaRef ds:uri="a17d4d82-232e-4eae-b6cc-834006444970"/>
+    <ds:schemaRef ds:uri="http://schemas.openxmlformats.org/package/2006/metadata/core-properties"/>
+    <ds:schemaRef ds:uri="http://purl.org/dc/elements/1.1/"/>
+    <ds:schemaRef ds:uri="http://schemas.microsoft.com/office/2006/metadata/properties"/>
+    <ds:schemaRef ds:uri="8ee9f6c3-3166-4f2b-8d05-f088b88e4d0e"/>
+    <ds:schemaRef ds:uri="http://schemas.microsoft.com/office/infopath/2007/PartnerControls"/>
+    <ds:schemaRef ds:uri="http://purl.org/dc/dcmitype/"/>
+  </ds:schemaRefs>
+</ds:datastoreItem>
 </file>
 
-<file path=customXml/item3.xml><?xml version="1.0" encoding="utf-8"?>
-<p:properties xmlns:p="http://schemas.microsoft.com/office/2006/metadata/properties" xmlns:xsi="http://www.w3.org/2001/XMLSchema-instance" xmlns:pc="http://schemas.microsoft.com/office/infopath/2007/PartnerControls">
-  <documentManagement/>
-</p:properties>
+<file path=customXml/itemProps2.xml><?xml version="1.0" encoding="utf-8"?>
+<ds:datastoreItem xmlns:ds="http://schemas.openxmlformats.org/officeDocument/2006/customXml" ds:itemID="{614DB8AA-2B4F-4D6C-AC8A-4001197DD381}">
+  <ds:schemaRefs>
+    <ds:schemaRef ds:uri="http://schemas.microsoft.com/sharepoint/v3/contenttype/forms"/>
+  </ds:schemaRefs>
+</ds:datastoreItem>
 </file>
 
-<file path=customXml/itemProps1.xml><?xml version="1.0" encoding="utf-8"?>
+<file path=customXml/itemProps3.xml><?xml version="1.0" encoding="utf-8"?>
 <ds:datastoreItem xmlns:ds="http://schemas.openxmlformats.org/officeDocument/2006/customXml" ds:itemID="{BF632B48-8873-4EAD-818A-1EC1F4680334}">
   <ds:schemaRefs>
     <ds:schemaRef ds:uri="http://schemas.microsoft.com/office/2006/metadata/contentType"/>
@@ -16143,29 +16186,4 @@
     <ds:schemaRef ds:uri="http://schemas.microsoft.com/internal/obd"/>
   </ds:schemaRefs>
 </ds:datastoreItem>
-</file>
-
-<file path=customXml/itemProps2.xml><?xml version="1.0" encoding="utf-8"?>
-<ds:datastoreItem xmlns:ds="http://schemas.openxmlformats.org/officeDocument/2006/customXml" ds:itemID="{614DB8AA-2B4F-4D6C-AC8A-4001197DD381}">
-  <ds:schemaRefs>
-    <ds:schemaRef ds:uri="http://schemas.microsoft.com/sharepoint/v3/contenttype/forms"/>
-  </ds:schemaRefs>
-</ds:datastoreItem>
-</file>
-
-<file path=customXml/itemProps3.xml><?xml version="1.0" encoding="utf-8"?>
-<ds:datastoreItem xmlns:ds="http://schemas.openxmlformats.org/officeDocument/2006/customXml" ds:itemID="{4FCD0442-6A9C-49E5-8376-CD3765CD18A2}">
-  <ds:schemaRefs>
-    <ds:schemaRef ds:uri="http://www.w3.org/XML/1998/namespace"/>
-    <ds:schemaRef ds:uri="http://purl.org/dc/terms/"/>
-    <ds:schemaRef ds:uri="http://schemas.microsoft.com/office/2006/documentManagement/types"/>
-    <ds:schemaRef ds:uri="a17d4d82-232e-4eae-b6cc-834006444970"/>
-    <ds:schemaRef ds:uri="http://schemas.openxmlformats.org/package/2006/metadata/core-properties"/>
-    <ds:schemaRef ds:uri="http://purl.org/dc/elements/1.1/"/>
-    <ds:schemaRef ds:uri="http://schemas.microsoft.com/office/2006/metadata/properties"/>
-    <ds:schemaRef ds:uri="8ee9f6c3-3166-4f2b-8d05-f088b88e4d0e"/>
-    <ds:schemaRef ds:uri="http://schemas.microsoft.com/office/infopath/2007/PartnerControls"/>
-    <ds:schemaRef ds:uri="http://purl.org/dc/dcmitype/"/>
-  </ds:schemaRefs>
-</ds:datastoreItem>
 </file>
</xml_diff>